<commit_message>
magnet design for thank you's
</commit_message>
<xml_diff>
--- a/TamaleParty2015/tamales-magnet.pptx
+++ b/TamaleParty2015/tamales-magnet.pptx
@@ -6,6 +6,7 @@
   </p:sldMasterIdLst>
   <p:sldIdLst>
     <p:sldId id="256" r:id="rId2"/>
+    <p:sldId id="257" r:id="rId3"/>
   </p:sldIdLst>
   <p:sldSz cx="9144000" cy="6858000" type="screen4x3"/>
   <p:notesSz cx="6858000" cy="9144000"/>
@@ -288,7 +289,7 @@
           <a:p>
             <a:fld id="{875AE676-7D6E-9642-BD1F-643EB1B7E9C5}" type="datetimeFigureOut">
               <a:rPr lang="en-US" smtClean="0"/>
-              <a:t>3/11/15</a:t>
+              <a:t>3/14/15</a:t>
             </a:fld>
             <a:endParaRPr lang="en-US"/>
           </a:p>
@@ -458,7 +459,7 @@
           <a:p>
             <a:fld id="{875AE676-7D6E-9642-BD1F-643EB1B7E9C5}" type="datetimeFigureOut">
               <a:rPr lang="en-US" smtClean="0"/>
-              <a:t>3/11/15</a:t>
+              <a:t>3/14/15</a:t>
             </a:fld>
             <a:endParaRPr lang="en-US"/>
           </a:p>
@@ -638,7 +639,7 @@
           <a:p>
             <a:fld id="{875AE676-7D6E-9642-BD1F-643EB1B7E9C5}" type="datetimeFigureOut">
               <a:rPr lang="en-US" smtClean="0"/>
-              <a:t>3/11/15</a:t>
+              <a:t>3/14/15</a:t>
             </a:fld>
             <a:endParaRPr lang="en-US"/>
           </a:p>
@@ -808,7 +809,7 @@
           <a:p>
             <a:fld id="{875AE676-7D6E-9642-BD1F-643EB1B7E9C5}" type="datetimeFigureOut">
               <a:rPr lang="en-US" smtClean="0"/>
-              <a:t>3/11/15</a:t>
+              <a:t>3/14/15</a:t>
             </a:fld>
             <a:endParaRPr lang="en-US"/>
           </a:p>
@@ -1054,7 +1055,7 @@
           <a:p>
             <a:fld id="{875AE676-7D6E-9642-BD1F-643EB1B7E9C5}" type="datetimeFigureOut">
               <a:rPr lang="en-US" smtClean="0"/>
-              <a:t>3/11/15</a:t>
+              <a:t>3/14/15</a:t>
             </a:fld>
             <a:endParaRPr lang="en-US"/>
           </a:p>
@@ -1342,7 +1343,7 @@
           <a:p>
             <a:fld id="{875AE676-7D6E-9642-BD1F-643EB1B7E9C5}" type="datetimeFigureOut">
               <a:rPr lang="en-US" smtClean="0"/>
-              <a:t>3/11/15</a:t>
+              <a:t>3/14/15</a:t>
             </a:fld>
             <a:endParaRPr lang="en-US"/>
           </a:p>
@@ -1764,7 +1765,7 @@
           <a:p>
             <a:fld id="{875AE676-7D6E-9642-BD1F-643EB1B7E9C5}" type="datetimeFigureOut">
               <a:rPr lang="en-US" smtClean="0"/>
-              <a:t>3/11/15</a:t>
+              <a:t>3/14/15</a:t>
             </a:fld>
             <a:endParaRPr lang="en-US"/>
           </a:p>
@@ -1882,7 +1883,7 @@
           <a:p>
             <a:fld id="{875AE676-7D6E-9642-BD1F-643EB1B7E9C5}" type="datetimeFigureOut">
               <a:rPr lang="en-US" smtClean="0"/>
-              <a:t>3/11/15</a:t>
+              <a:t>3/14/15</a:t>
             </a:fld>
             <a:endParaRPr lang="en-US"/>
           </a:p>
@@ -1977,7 +1978,7 @@
           <a:p>
             <a:fld id="{875AE676-7D6E-9642-BD1F-643EB1B7E9C5}" type="datetimeFigureOut">
               <a:rPr lang="en-US" smtClean="0"/>
-              <a:t>3/11/15</a:t>
+              <a:t>3/14/15</a:t>
             </a:fld>
             <a:endParaRPr lang="en-US"/>
           </a:p>
@@ -2254,7 +2255,7 @@
           <a:p>
             <a:fld id="{875AE676-7D6E-9642-BD1F-643EB1B7E9C5}" type="datetimeFigureOut">
               <a:rPr lang="en-US" smtClean="0"/>
-              <a:t>3/11/15</a:t>
+              <a:t>3/14/15</a:t>
             </a:fld>
             <a:endParaRPr lang="en-US"/>
           </a:p>
@@ -2507,7 +2508,7 @@
           <a:p>
             <a:fld id="{875AE676-7D6E-9642-BD1F-643EB1B7E9C5}" type="datetimeFigureOut">
               <a:rPr lang="en-US" smtClean="0"/>
-              <a:t>3/11/15</a:t>
+              <a:t>3/14/15</a:t>
             </a:fld>
             <a:endParaRPr lang="en-US"/>
           </a:p>
@@ -2720,7 +2721,7 @@
           <a:p>
             <a:fld id="{875AE676-7D6E-9642-BD1F-643EB1B7E9C5}" type="datetimeFigureOut">
               <a:rPr lang="en-US" smtClean="0"/>
-              <a:t>3/11/15</a:t>
+              <a:t>3/14/15</a:t>
             </a:fld>
             <a:endParaRPr lang="en-US"/>
           </a:p>
@@ -3110,7 +3111,7 @@
           </a:stretch>
         </p:blipFill>
         <p:spPr>
-          <a:xfrm rot="669070">
+          <a:xfrm rot="4349636">
             <a:off x="1998100" y="125565"/>
             <a:ext cx="4241800" cy="6527800"/>
           </a:xfrm>
@@ -3126,8 +3127,8 @@
           <p:nvPr/>
         </p:nvSpPr>
         <p:spPr>
-          <a:xfrm rot="17777150">
-            <a:off x="-760586" y="2273390"/>
+          <a:xfrm rot="21457716">
+            <a:off x="1017413" y="987516"/>
             <a:ext cx="5853411" cy="769441"/>
           </a:xfrm>
           <a:prstGeom prst="rect">
@@ -3173,8 +3174,8 @@
           <p:nvPr/>
         </p:nvSpPr>
         <p:spPr>
-          <a:xfrm rot="18082437">
-            <a:off x="2199588" y="3800600"/>
+          <a:xfrm rot="152702">
+            <a:off x="770837" y="4546726"/>
             <a:ext cx="6602089" cy="769441"/>
           </a:xfrm>
           <a:prstGeom prst="rect">
@@ -3215,14 +3216,14 @@
       </p:sp>
       <p:sp>
         <p:nvSpPr>
-          <p:cNvPr id="5" name="TextBox 4"/>
+          <p:cNvPr id="8" name="TextBox 7"/>
           <p:cNvSpPr txBox="1"/>
           <p:nvPr/>
         </p:nvSpPr>
         <p:spPr>
-          <a:xfrm rot="18082437">
-            <a:off x="3068747" y="4206387"/>
-            <a:ext cx="5750208" cy="523220"/>
+          <a:xfrm rot="152702">
+            <a:off x="1146962" y="5147062"/>
+            <a:ext cx="5769981" cy="523220"/>
           </a:xfrm>
           <a:prstGeom prst="rect">
             <a:avLst/>
@@ -3258,10 +3259,22 @@
                 <a:latin typeface="Nexa Rust Script L 0"/>
                 <a:cs typeface="Nexa Rust Script L 0"/>
               </a:rPr>
-              <a:t> O</a:t>
-            </a:r>
-            <a:r>
-              <a:rPr lang="en-US" sz="2800" dirty="0" smtClean="0">
+              <a:t> </a:t>
+            </a:r>
+            <a:r>
+              <a:rPr lang="en-US" sz="2800" dirty="0">
+                <a:solidFill>
+                  <a:schemeClr val="accent6">
+                    <a:lumMod val="50000"/>
+                  </a:schemeClr>
+                </a:solidFill>
+                <a:latin typeface="Nexa Rust Script L 0"/>
+                <a:cs typeface="Nexa Rust Script L 0"/>
+              </a:rPr>
+              <a:t>O</a:t>
+            </a:r>
+            <a:r>
+              <a:rPr lang="en-US" sz="2800" dirty="0">
                 <a:solidFill>
                   <a:schemeClr val="accent6">
                     <a:lumMod val="50000"/>
@@ -3273,6 +3286,18 @@
               <a:t>’</a:t>
             </a:r>
             <a:r>
+              <a:rPr lang="en-US" sz="2800" dirty="0">
+                <a:solidFill>
+                  <a:schemeClr val="accent6">
+                    <a:lumMod val="50000"/>
+                  </a:schemeClr>
+                </a:solidFill>
+                <a:latin typeface="Nexa Rust Script L 0"/>
+                <a:cs typeface="Nexa Rust Script L 0"/>
+              </a:rPr>
+              <a:t>Connell Fundraiser </a:t>
+            </a:r>
+            <a:r>
               <a:rPr lang="en-US" sz="2800" dirty="0" smtClean="0">
                 <a:solidFill>
                   <a:schemeClr val="accent6">
@@ -3282,7 +3307,7 @@
                 <a:latin typeface="Nexa Rust Script L 0"/>
                 <a:cs typeface="Nexa Rust Script L 0"/>
               </a:rPr>
-              <a:t>Connell Fundraiser 2015</a:t>
+              <a:t>2015</a:t>
             </a:r>
             <a:endParaRPr lang="en-US" sz="2800" dirty="0">
               <a:solidFill>
@@ -3300,6 +3325,268 @@
     <p:extLst>
       <p:ext uri="{BB962C8B-B14F-4D97-AF65-F5344CB8AC3E}">
         <p14:creationId xmlns:p14="http://schemas.microsoft.com/office/powerpoint/2010/main" val="4109217189"/>
+      </p:ext>
+    </p:extLst>
+  </p:cSld>
+  <p:clrMapOvr>
+    <a:masterClrMapping/>
+  </p:clrMapOvr>
+  <p:timing>
+    <p:tnLst>
+      <p:par>
+        <p:cTn xmlns:p14="http://schemas.microsoft.com/office/powerpoint/2010/main" id="1" dur="indefinite" restart="never" nodeType="tmRoot"/>
+      </p:par>
+    </p:tnLst>
+  </p:timing>
+</p:sld>
+</file>
+
+<file path=ppt/slides/slide2.xml><?xml version="1.0" encoding="utf-8"?>
+<p:sld xmlns:a="http://schemas.openxmlformats.org/drawingml/2006/main" xmlns:r="http://schemas.openxmlformats.org/officeDocument/2006/relationships" xmlns:p="http://schemas.openxmlformats.org/presentationml/2006/main">
+  <p:cSld>
+    <p:spTree>
+      <p:nvGrpSpPr>
+        <p:cNvPr id="1" name=""/>
+        <p:cNvGrpSpPr/>
+        <p:nvPr/>
+      </p:nvGrpSpPr>
+      <p:grpSpPr>
+        <a:xfrm>
+          <a:off x="0" y="0"/>
+          <a:ext cx="0" cy="0"/>
+          <a:chOff x="0" y="0"/>
+          <a:chExt cx="0" cy="0"/>
+        </a:xfrm>
+      </p:grpSpPr>
+      <p:pic>
+        <p:nvPicPr>
+          <p:cNvPr id="6" name="Picture 5"/>
+          <p:cNvPicPr>
+            <a:picLocks noChangeAspect="1"/>
+          </p:cNvPicPr>
+          <p:nvPr/>
+        </p:nvPicPr>
+        <p:blipFill>
+          <a:blip r:embed="rId2"/>
+          <a:stretch>
+            <a:fillRect/>
+          </a:stretch>
+        </p:blipFill>
+        <p:spPr>
+          <a:xfrm rot="4349636">
+            <a:off x="2379100" y="125565"/>
+            <a:ext cx="4241800" cy="6527800"/>
+          </a:xfrm>
+          <a:prstGeom prst="rect">
+            <a:avLst/>
+          </a:prstGeom>
+        </p:spPr>
+      </p:pic>
+      <p:sp>
+        <p:nvSpPr>
+          <p:cNvPr id="7" name="TextBox 6"/>
+          <p:cNvSpPr txBox="1"/>
+          <p:nvPr/>
+        </p:nvSpPr>
+        <p:spPr>
+          <a:xfrm>
+            <a:off x="1" y="880836"/>
+            <a:ext cx="9144000" cy="769441"/>
+          </a:xfrm>
+          <a:prstGeom prst="rect">
+            <a:avLst/>
+          </a:prstGeom>
+          <a:noFill/>
+        </p:spPr>
+        <p:txBody>
+          <a:bodyPr wrap="square" rtlCol="0">
+            <a:spAutoFit/>
+          </a:bodyPr>
+          <a:lstStyle/>
+          <a:p>
+            <a:pPr algn="ctr"/>
+            <a:r>
+              <a:rPr lang="en-US" sz="4400" dirty="0" smtClean="0">
+                <a:solidFill>
+                  <a:schemeClr val="accent6">
+                    <a:lumMod val="50000"/>
+                  </a:schemeClr>
+                </a:solidFill>
+                <a:latin typeface="Nexa Rust Slab Black Shadow 01"/>
+                <a:cs typeface="Nexa Rust Slab Black Shadow 01"/>
+              </a:rPr>
+              <a:t>TAMALES are A</a:t>
+            </a:r>
+            <a:endParaRPr lang="en-US" sz="4400" dirty="0">
+              <a:solidFill>
+                <a:schemeClr val="accent6">
+                  <a:lumMod val="50000"/>
+                </a:schemeClr>
+              </a:solidFill>
+              <a:latin typeface="Nexa Rust Slab Black Shadow 01"/>
+              <a:cs typeface="Nexa Rust Slab Black Shadow 01"/>
+            </a:endParaRPr>
+          </a:p>
+        </p:txBody>
+      </p:sp>
+      <p:sp>
+        <p:nvSpPr>
+          <p:cNvPr id="4" name="TextBox 3"/>
+          <p:cNvSpPr txBox="1"/>
+          <p:nvPr/>
+        </p:nvSpPr>
+        <p:spPr>
+          <a:xfrm>
+            <a:off x="0" y="4691559"/>
+            <a:ext cx="9144000" cy="769441"/>
+          </a:xfrm>
+          <a:prstGeom prst="rect">
+            <a:avLst/>
+          </a:prstGeom>
+          <a:noFill/>
+        </p:spPr>
+        <p:txBody>
+          <a:bodyPr wrap="square" rtlCol="0">
+            <a:spAutoFit/>
+          </a:bodyPr>
+          <a:lstStyle/>
+          <a:p>
+            <a:pPr algn="ctr"/>
+            <a:r>
+              <a:rPr lang="en-US" sz="4400" dirty="0" smtClean="0">
+                <a:solidFill>
+                  <a:schemeClr val="accent6">
+                    <a:lumMod val="50000"/>
+                  </a:schemeClr>
+                </a:solidFill>
+                <a:latin typeface="Nexa Rust Slab Black Shadow 01"/>
+                <a:cs typeface="Nexa Rust Slab Black Shadow 01"/>
+              </a:rPr>
+              <a:t>force for good</a:t>
+            </a:r>
+            <a:endParaRPr lang="en-US" sz="4400" dirty="0">
+              <a:solidFill>
+                <a:schemeClr val="accent6">
+                  <a:lumMod val="50000"/>
+                </a:schemeClr>
+              </a:solidFill>
+              <a:latin typeface="Nexa Rust Slab Black Shadow 01"/>
+              <a:cs typeface="Nexa Rust Slab Black Shadow 01"/>
+            </a:endParaRPr>
+          </a:p>
+        </p:txBody>
+      </p:sp>
+      <p:sp>
+        <p:nvSpPr>
+          <p:cNvPr id="8" name="TextBox 7"/>
+          <p:cNvSpPr txBox="1"/>
+          <p:nvPr/>
+        </p:nvSpPr>
+        <p:spPr>
+          <a:xfrm>
+            <a:off x="0" y="5302250"/>
+            <a:ext cx="9144000" cy="523220"/>
+          </a:xfrm>
+          <a:prstGeom prst="rect">
+            <a:avLst/>
+          </a:prstGeom>
+          <a:noFill/>
+        </p:spPr>
+        <p:txBody>
+          <a:bodyPr wrap="square" rtlCol="0">
+            <a:spAutoFit/>
+          </a:bodyPr>
+          <a:lstStyle/>
+          <a:p>
+            <a:pPr algn="ctr"/>
+            <a:r>
+              <a:rPr lang="en-US" sz="2800" dirty="0" err="1" smtClean="0">
+                <a:solidFill>
+                  <a:schemeClr val="accent6">
+                    <a:lumMod val="50000"/>
+                  </a:schemeClr>
+                </a:solidFill>
+                <a:latin typeface="Nexa Rust Script L 0"/>
+                <a:cs typeface="Nexa Rust Script L 0"/>
+              </a:rPr>
+              <a:t>Donal</a:t>
+            </a:r>
+            <a:r>
+              <a:rPr lang="en-US" sz="2800" dirty="0" smtClean="0">
+                <a:solidFill>
+                  <a:schemeClr val="accent6">
+                    <a:lumMod val="50000"/>
+                  </a:schemeClr>
+                </a:solidFill>
+                <a:latin typeface="Nexa Rust Script L 0"/>
+                <a:cs typeface="Nexa Rust Script L 0"/>
+              </a:rPr>
+              <a:t> </a:t>
+            </a:r>
+            <a:r>
+              <a:rPr lang="en-US" sz="2800" dirty="0">
+                <a:solidFill>
+                  <a:schemeClr val="accent6">
+                    <a:lumMod val="50000"/>
+                  </a:schemeClr>
+                </a:solidFill>
+                <a:latin typeface="Nexa Rust Script L 0"/>
+                <a:cs typeface="Nexa Rust Script L 0"/>
+              </a:rPr>
+              <a:t>O</a:t>
+            </a:r>
+            <a:r>
+              <a:rPr lang="en-US" sz="2800" dirty="0">
+                <a:solidFill>
+                  <a:schemeClr val="accent6">
+                    <a:lumMod val="50000"/>
+                  </a:schemeClr>
+                </a:solidFill>
+                <a:latin typeface="Comic Sans MS"/>
+                <a:cs typeface="Comic Sans MS"/>
+              </a:rPr>
+              <a:t>’</a:t>
+            </a:r>
+            <a:r>
+              <a:rPr lang="en-US" sz="2800" dirty="0">
+                <a:solidFill>
+                  <a:schemeClr val="accent6">
+                    <a:lumMod val="50000"/>
+                  </a:schemeClr>
+                </a:solidFill>
+                <a:latin typeface="Nexa Rust Script L 0"/>
+                <a:cs typeface="Nexa Rust Script L 0"/>
+              </a:rPr>
+              <a:t>Connell </a:t>
+            </a:r>
+            <a:r>
+              <a:rPr lang="en-US" sz="2800" dirty="0" smtClean="0">
+                <a:solidFill>
+                  <a:schemeClr val="accent6">
+                    <a:lumMod val="50000"/>
+                  </a:schemeClr>
+                </a:solidFill>
+                <a:latin typeface="Nexa Rust Script L 0"/>
+                <a:cs typeface="Nexa Rust Script L 0"/>
+              </a:rPr>
+              <a:t>Fundraiser</a:t>
+            </a:r>
+            <a:endParaRPr lang="en-US" sz="2800" dirty="0">
+              <a:solidFill>
+                <a:schemeClr val="accent6">
+                  <a:lumMod val="50000"/>
+                </a:schemeClr>
+              </a:solidFill>
+              <a:latin typeface="Nexa Rust Script L 0"/>
+              <a:cs typeface="Nexa Rust Script L 0"/>
+            </a:endParaRPr>
+          </a:p>
+        </p:txBody>
+      </p:sp>
+    </p:spTree>
+    <p:extLst>
+      <p:ext uri="{BB962C8B-B14F-4D97-AF65-F5344CB8AC3E}">
+        <p14:creationId xmlns:p14="http://schemas.microsoft.com/office/powerpoint/2010/main" val="1162616700"/>
       </p:ext>
     </p:extLst>
   </p:cSld>

</xml_diff>